<commit_message>
some changes on B&V's ppt part
</commit_message>
<xml_diff>
--- a/Class Presentations/2th-presentation/Presentation Vincent Bruno 15 04.pptx
+++ b/Class Presentations/2th-presentation/Presentation Vincent Bruno 15 04.pptx
@@ -109,7 +109,7 @@
   </p:defaultTextStyle>
   <p:extLst>
     <p:ext uri="{EFAFB233-063F-42B5-8137-9DF3F51BA10A}">
-      <p15:sldGuideLst xmlns:p15="http://schemas.microsoft.com/office/powerpoint/2012/main">
+      <p15:sldGuideLst xmlns:p15="http://schemas.microsoft.com/office/powerpoint/2012/main" xmlns="">
         <p15:guide id="1" orient="horz" pos="2160">
           <p15:clr>
             <a:srgbClr val="A4A3A4"/>
@@ -257,7 +257,7 @@
           <a:p>
             <a:fld id="{D31CDDC8-0BB0-4FFB-A1B8-B0F5E073C0F7}" type="datetimeFigureOut">
               <a:rPr lang="fr-FR" smtClean="0"/>
-              <a:t>13/04/2015</a:t>
+              <a:t>14/04/2015</a:t>
             </a:fld>
             <a:endParaRPr lang="fr-FR"/>
           </a:p>
@@ -427,7 +427,7 @@
           <a:p>
             <a:fld id="{D31CDDC8-0BB0-4FFB-A1B8-B0F5E073C0F7}" type="datetimeFigureOut">
               <a:rPr lang="fr-FR" smtClean="0"/>
-              <a:t>13/04/2015</a:t>
+              <a:t>14/04/2015</a:t>
             </a:fld>
             <a:endParaRPr lang="fr-FR"/>
           </a:p>
@@ -607,7 +607,7 @@
           <a:p>
             <a:fld id="{D31CDDC8-0BB0-4FFB-A1B8-B0F5E073C0F7}" type="datetimeFigureOut">
               <a:rPr lang="fr-FR" smtClean="0"/>
-              <a:t>13/04/2015</a:t>
+              <a:t>14/04/2015</a:t>
             </a:fld>
             <a:endParaRPr lang="fr-FR"/>
           </a:p>
@@ -777,7 +777,7 @@
           <a:p>
             <a:fld id="{D31CDDC8-0BB0-4FFB-A1B8-B0F5E073C0F7}" type="datetimeFigureOut">
               <a:rPr lang="fr-FR" smtClean="0"/>
-              <a:t>13/04/2015</a:t>
+              <a:t>14/04/2015</a:t>
             </a:fld>
             <a:endParaRPr lang="fr-FR"/>
           </a:p>
@@ -1023,7 +1023,7 @@
           <a:p>
             <a:fld id="{D31CDDC8-0BB0-4FFB-A1B8-B0F5E073C0F7}" type="datetimeFigureOut">
               <a:rPr lang="fr-FR" smtClean="0"/>
-              <a:t>13/04/2015</a:t>
+              <a:t>14/04/2015</a:t>
             </a:fld>
             <a:endParaRPr lang="fr-FR"/>
           </a:p>
@@ -1255,7 +1255,7 @@
           <a:p>
             <a:fld id="{D31CDDC8-0BB0-4FFB-A1B8-B0F5E073C0F7}" type="datetimeFigureOut">
               <a:rPr lang="fr-FR" smtClean="0"/>
-              <a:t>13/04/2015</a:t>
+              <a:t>14/04/2015</a:t>
             </a:fld>
             <a:endParaRPr lang="fr-FR"/>
           </a:p>
@@ -1622,7 +1622,7 @@
           <a:p>
             <a:fld id="{D31CDDC8-0BB0-4FFB-A1B8-B0F5E073C0F7}" type="datetimeFigureOut">
               <a:rPr lang="fr-FR" smtClean="0"/>
-              <a:t>13/04/2015</a:t>
+              <a:t>14/04/2015</a:t>
             </a:fld>
             <a:endParaRPr lang="fr-FR"/>
           </a:p>
@@ -1740,7 +1740,7 @@
           <a:p>
             <a:fld id="{D31CDDC8-0BB0-4FFB-A1B8-B0F5E073C0F7}" type="datetimeFigureOut">
               <a:rPr lang="fr-FR" smtClean="0"/>
-              <a:t>13/04/2015</a:t>
+              <a:t>14/04/2015</a:t>
             </a:fld>
             <a:endParaRPr lang="fr-FR"/>
           </a:p>
@@ -1835,7 +1835,7 @@
           <a:p>
             <a:fld id="{D31CDDC8-0BB0-4FFB-A1B8-B0F5E073C0F7}" type="datetimeFigureOut">
               <a:rPr lang="fr-FR" smtClean="0"/>
-              <a:t>13/04/2015</a:t>
+              <a:t>14/04/2015</a:t>
             </a:fld>
             <a:endParaRPr lang="fr-FR"/>
           </a:p>
@@ -2112,7 +2112,7 @@
           <a:p>
             <a:fld id="{D31CDDC8-0BB0-4FFB-A1B8-B0F5E073C0F7}" type="datetimeFigureOut">
               <a:rPr lang="fr-FR" smtClean="0"/>
-              <a:t>13/04/2015</a:t>
+              <a:t>14/04/2015</a:t>
             </a:fld>
             <a:endParaRPr lang="fr-FR"/>
           </a:p>
@@ -2365,7 +2365,7 @@
           <a:p>
             <a:fld id="{D31CDDC8-0BB0-4FFB-A1B8-B0F5E073C0F7}" type="datetimeFigureOut">
               <a:rPr lang="fr-FR" smtClean="0"/>
-              <a:t>13/04/2015</a:t>
+              <a:t>14/04/2015</a:t>
             </a:fld>
             <a:endParaRPr lang="fr-FR"/>
           </a:p>
@@ -2578,7 +2578,7 @@
           <a:p>
             <a:fld id="{D31CDDC8-0BB0-4FFB-A1B8-B0F5E073C0F7}" type="datetimeFigureOut">
               <a:rPr lang="fr-FR" smtClean="0"/>
-              <a:t>13/04/2015</a:t>
+              <a:t>14/04/2015</a:t>
             </a:fld>
             <a:endParaRPr lang="fr-FR"/>
           </a:p>
@@ -3653,6 +3653,60 @@
       </p:grpSpPr>
       <p:pic>
         <p:nvPicPr>
+          <p:cNvPr id="1026" name="Picture 2"/>
+          <p:cNvPicPr>
+            <a:picLocks noChangeAspect="1" noChangeArrowheads="1"/>
+          </p:cNvPicPr>
+          <p:nvPr/>
+        </p:nvPicPr>
+        <p:blipFill>
+          <a:blip r:embed="rId2">
+            <a:extLst>
+              <a:ext uri="{28A0092B-C50C-407E-A947-70E740481C1C}">
+                <a14:useLocalDpi xmlns:a14="http://schemas.microsoft.com/office/drawing/2010/main" val="0"/>
+              </a:ext>
+            </a:extLst>
+          </a:blip>
+          <a:srcRect/>
+          <a:stretch>
+            <a:fillRect/>
+          </a:stretch>
+        </p:blipFill>
+        <p:spPr bwMode="auto">
+          <a:xfrm>
+            <a:off x="8636001" y="3303547"/>
+            <a:ext cx="3333750" cy="1981200"/>
+          </a:xfrm>
+          <a:prstGeom prst="rect">
+            <a:avLst/>
+          </a:prstGeom>
+          <a:noFill/>
+          <a:ln>
+            <a:noFill/>
+          </a:ln>
+          <a:extLst>
+            <a:ext uri="{909E8E84-426E-40DD-AFC4-6F175D3DCCD1}">
+              <a14:hiddenFill xmlns:a14="http://schemas.microsoft.com/office/drawing/2010/main">
+                <a:solidFill>
+                  <a:schemeClr val="accent1"/>
+                </a:solidFill>
+              </a14:hiddenFill>
+            </a:ext>
+            <a:ext uri="{91240B29-F687-4F45-9708-019B960494DF}">
+              <a14:hiddenLine xmlns:a14="http://schemas.microsoft.com/office/drawing/2010/main" w="9525">
+                <a:solidFill>
+                  <a:schemeClr val="tx1"/>
+                </a:solidFill>
+                <a:miter lim="800000"/>
+                <a:headEnd/>
+                <a:tailEnd/>
+              </a14:hiddenLine>
+            </a:ext>
+          </a:extLst>
+        </p:spPr>
+      </p:pic>
+      <p:pic>
+        <p:nvPicPr>
           <p:cNvPr id="4" name="Image 3"/>
           <p:cNvPicPr>
             <a:picLocks noChangeAspect="1"/>
@@ -3660,7 +3714,7 @@
           <p:nvPr/>
         </p:nvPicPr>
         <p:blipFill>
-          <a:blip r:embed="rId2">
+          <a:blip r:embed="rId3">
             <a:extLst>
               <a:ext uri="{28A0092B-C50C-407E-A947-70E740481C1C}">
                 <a14:useLocalDpi xmlns:a14="http://schemas.microsoft.com/office/drawing/2010/main" val="0"/>
@@ -3717,7 +3771,7 @@
         <p:spPr/>
         <p:txBody>
           <a:bodyPr>
-            <a:normAutofit fontScale="92500" lnSpcReduction="10000"/>
+            <a:normAutofit fontScale="85000" lnSpcReduction="20000"/>
           </a:bodyPr>
           <a:lstStyle/>
           <a:p>
@@ -3752,12 +3806,28 @@
               <a:t></a:t>
             </a:r>
             <a:r>
+              <a:rPr lang="fr-FR" sz="2400" b="1" dirty="0" smtClean="0">
+                <a:sym typeface="Wingdings" panose="05000000000000000000" pitchFamily="2" charset="2"/>
+              </a:rPr>
+              <a:t>WHO</a:t>
+            </a:r>
+            <a:r>
+              <a:rPr lang="fr-FR" sz="2400" dirty="0" smtClean="0">
+                <a:sym typeface="Wingdings" panose="05000000000000000000" pitchFamily="2" charset="2"/>
+              </a:rPr>
+              <a:t>? </a:t>
+            </a:r>
+            <a:r>
               <a:rPr lang="en-US" sz="2400" dirty="0" smtClean="0"/>
               <a:t>Companies</a:t>
             </a:r>
             <a:r>
               <a:rPr lang="fr-FR" sz="2400" dirty="0" smtClean="0"/>
-              <a:t> (</a:t>
+              <a:t> </a:t>
+            </a:r>
+            <a:r>
+              <a:rPr lang="fr-FR" sz="2400" dirty="0" smtClean="0"/>
+              <a:t>(</a:t>
             </a:r>
             <a:r>
               <a:rPr lang="fr-FR" sz="2400" dirty="0" err="1" smtClean="0"/>
@@ -3787,12 +3857,16 @@
               <a:t></a:t>
             </a:r>
             <a:r>
-              <a:rPr lang="fr-FR" sz="2400" dirty="0" err="1" smtClean="0"/>
-              <a:t>E.g</a:t>
+              <a:rPr lang="fr-FR" sz="2400" b="1" dirty="0" smtClean="0"/>
+              <a:t>WHAT</a:t>
             </a:r>
             <a:r>
               <a:rPr lang="fr-FR" sz="2400" dirty="0" smtClean="0"/>
-              <a:t>. Plug in system, standardisation of the </a:t>
+              <a:t>? </a:t>
+            </a:r>
+            <a:r>
+              <a:rPr lang="fr-FR" sz="2400" dirty="0" smtClean="0"/>
+              <a:t>Plug in system, standardisation of the </a:t>
             </a:r>
             <a:r>
               <a:rPr lang="en-US" sz="2400" dirty="0" smtClean="0"/>
@@ -3886,12 +3960,28 @@
               <a:t></a:t>
             </a:r>
             <a:r>
+              <a:rPr lang="fr-FR" sz="2400" b="1" dirty="0" smtClean="0">
+                <a:sym typeface="Wingdings" panose="05000000000000000000" pitchFamily="2" charset="2"/>
+              </a:rPr>
+              <a:t>WHO</a:t>
+            </a:r>
+            <a:r>
+              <a:rPr lang="fr-FR" sz="2400" dirty="0" smtClean="0">
+                <a:sym typeface="Wingdings" panose="05000000000000000000" pitchFamily="2" charset="2"/>
+              </a:rPr>
+              <a:t>? </a:t>
+            </a:r>
+            <a:r>
               <a:rPr lang="en-US" sz="2400" dirty="0" smtClean="0"/>
               <a:t>Governments</a:t>
             </a:r>
             <a:r>
               <a:rPr lang="fr-FR" sz="2400" dirty="0" smtClean="0"/>
-              <a:t> and </a:t>
+              <a:t> </a:t>
+            </a:r>
+            <a:r>
+              <a:rPr lang="fr-FR" sz="2400" dirty="0" smtClean="0"/>
+              <a:t>and </a:t>
             </a:r>
             <a:r>
               <a:rPr lang="fr-FR" sz="2400" dirty="0" err="1" smtClean="0"/>
@@ -3913,9 +4003,19 @@
               <a:rPr lang="en-US" sz="2400" dirty="0"/>
               <a:t> </a:t>
             </a:r>
+            <a:endParaRPr lang="en-US" sz="2400" dirty="0" smtClean="0"/>
+          </a:p>
+          <a:p>
+            <a:pPr marL="0" lvl="0" indent="0">
+              <a:buNone/>
+            </a:pPr>
             <a:r>
               <a:rPr lang="en-US" sz="2400" dirty="0" smtClean="0"/>
-              <a:t>Commission, European </a:t>
+              <a:t>Commission</a:t>
+            </a:r>
+            <a:r>
+              <a:rPr lang="en-US" sz="2400" dirty="0" smtClean="0"/>
+              <a:t>, European </a:t>
             </a:r>
             <a:r>
               <a:rPr lang="en-US" sz="2400" dirty="0"/>
@@ -3945,16 +4045,42 @@
               <a:t></a:t>
             </a:r>
             <a:r>
-              <a:rPr lang="en-US" sz="2400" dirty="0" err="1" smtClean="0">
+              <a:rPr lang="en-US" sz="2400" b="1" dirty="0" smtClean="0">
                 <a:sym typeface="Wingdings" panose="05000000000000000000" pitchFamily="2" charset="2"/>
               </a:rPr>
-              <a:t>E.g</a:t>
+              <a:t>WHAT</a:t>
             </a:r>
             <a:r>
               <a:rPr lang="en-US" sz="2400" dirty="0" smtClean="0">
                 <a:sym typeface="Wingdings" panose="05000000000000000000" pitchFamily="2" charset="2"/>
               </a:rPr>
-              <a:t> Creation of a section “EV charging stations” in the National Electronic Code (NEC, US)</a:t>
+              <a:t>? Creation </a:t>
+            </a:r>
+            <a:r>
+              <a:rPr lang="en-US" sz="2400" dirty="0" smtClean="0">
+                <a:sym typeface="Wingdings" panose="05000000000000000000" pitchFamily="2" charset="2"/>
+              </a:rPr>
+              <a:t>of a section “EV charging stations” in the National </a:t>
+            </a:r>
+            <a:endParaRPr lang="en-US" sz="2400" dirty="0" smtClean="0">
+              <a:sym typeface="Wingdings" panose="05000000000000000000" pitchFamily="2" charset="2"/>
+            </a:endParaRPr>
+          </a:p>
+          <a:p>
+            <a:pPr marL="0" lvl="0" indent="0">
+              <a:buNone/>
+            </a:pPr>
+            <a:r>
+              <a:rPr lang="en-US" sz="2400" dirty="0" smtClean="0">
+                <a:sym typeface="Wingdings" panose="05000000000000000000" pitchFamily="2" charset="2"/>
+              </a:rPr>
+              <a:t>Electronic </a:t>
+            </a:r>
+            <a:r>
+              <a:rPr lang="en-US" sz="2400" dirty="0" smtClean="0">
+                <a:sym typeface="Wingdings" panose="05000000000000000000" pitchFamily="2" charset="2"/>
+              </a:rPr>
+              <a:t>Code (NEC, US)</a:t>
             </a:r>
             <a:endParaRPr lang="fr-FR" sz="2400" dirty="0"/>
           </a:p>
@@ -4280,7 +4406,7 @@
   <a:extraClrSchemeLst/>
   <a:extLst>
     <a:ext uri="{05A4C25C-085E-4340-85A3-A5531E510DB2}">
-      <thm15:themeFamily xmlns:thm15="http://schemas.microsoft.com/office/thememl/2012/main" name="Office Theme" id="{62F939B6-93AF-4DB8-9C6B-D6C7DFDC589F}" vid="{4A3C46E8-61CC-4603-A589-7422A47A8E4A}"/>
+      <thm15:themeFamily xmlns:thm15="http://schemas.microsoft.com/office/thememl/2012/main" xmlns="" name="Office Theme" id="{62F939B6-93AF-4DB8-9C6B-D6C7DFDC589F}" vid="{4A3C46E8-61CC-4603-A589-7422A47A8E4A}"/>
     </a:ext>
   </a:extLst>
 </a:theme>

</xml_diff>